<commit_message>
Add section on proposed UI changes
</commit_message>
<xml_diff>
--- a/docs/diagrams/UiComponentClassDiagram.pptx
+++ b/docs/diagrams/UiComponentClassDiagram.pptx
@@ -208,7 +208,7 @@
           <a:p>
             <a:fld id="{F5CC4B3F-88C1-4FFA-B1B6-F41C21DC6924}" type="datetimeFigureOut">
               <a:rPr lang="en-US" smtClean="0"/>
-              <a:t>1/7/2017</a:t>
+              <a:t>3/20/2018</a:t>
             </a:fld>
             <a:endParaRPr lang="en-US"/>
           </a:p>
@@ -654,7 +654,7 @@
           <a:p>
             <a:fld id="{78C97017-6FC3-485B-9764-EAC9E56C1D49}" type="datetimeFigureOut">
               <a:rPr lang="en-US" smtClean="0"/>
-              <a:t>1/7/2017</a:t>
+              <a:t>3/20/2018</a:t>
             </a:fld>
             <a:endParaRPr lang="en-US"/>
           </a:p>
@@ -822,7 +822,7 @@
           <a:p>
             <a:fld id="{78C97017-6FC3-485B-9764-EAC9E56C1D49}" type="datetimeFigureOut">
               <a:rPr lang="en-US" smtClean="0"/>
-              <a:t>1/7/2017</a:t>
+              <a:t>3/20/2018</a:t>
             </a:fld>
             <a:endParaRPr lang="en-US"/>
           </a:p>
@@ -1000,7 +1000,7 @@
           <a:p>
             <a:fld id="{78C97017-6FC3-485B-9764-EAC9E56C1D49}" type="datetimeFigureOut">
               <a:rPr lang="en-US" smtClean="0"/>
-              <a:t>1/7/2017</a:t>
+              <a:t>3/20/2018</a:t>
             </a:fld>
             <a:endParaRPr lang="en-US"/>
           </a:p>
@@ -1168,7 +1168,7 @@
           <a:p>
             <a:fld id="{78C97017-6FC3-485B-9764-EAC9E56C1D49}" type="datetimeFigureOut">
               <a:rPr lang="en-US" smtClean="0"/>
-              <a:t>1/7/2017</a:t>
+              <a:t>3/20/2018</a:t>
             </a:fld>
             <a:endParaRPr lang="en-US"/>
           </a:p>
@@ -1413,7 +1413,7 @@
           <a:p>
             <a:fld id="{78C97017-6FC3-485B-9764-EAC9E56C1D49}" type="datetimeFigureOut">
               <a:rPr lang="en-US" smtClean="0"/>
-              <a:t>1/7/2017</a:t>
+              <a:t>3/20/2018</a:t>
             </a:fld>
             <a:endParaRPr lang="en-US"/>
           </a:p>
@@ -1698,7 +1698,7 @@
           <a:p>
             <a:fld id="{78C97017-6FC3-485B-9764-EAC9E56C1D49}" type="datetimeFigureOut">
               <a:rPr lang="en-US" smtClean="0"/>
-              <a:t>1/7/2017</a:t>
+              <a:t>3/20/2018</a:t>
             </a:fld>
             <a:endParaRPr lang="en-US"/>
           </a:p>
@@ -2117,7 +2117,7 @@
           <a:p>
             <a:fld id="{78C97017-6FC3-485B-9764-EAC9E56C1D49}" type="datetimeFigureOut">
               <a:rPr lang="en-US" smtClean="0"/>
-              <a:t>1/7/2017</a:t>
+              <a:t>3/20/2018</a:t>
             </a:fld>
             <a:endParaRPr lang="en-US"/>
           </a:p>
@@ -2234,7 +2234,7 @@
           <a:p>
             <a:fld id="{78C97017-6FC3-485B-9764-EAC9E56C1D49}" type="datetimeFigureOut">
               <a:rPr lang="en-US" smtClean="0"/>
-              <a:t>1/7/2017</a:t>
+              <a:t>3/20/2018</a:t>
             </a:fld>
             <a:endParaRPr lang="en-US"/>
           </a:p>
@@ -2329,7 +2329,7 @@
           <a:p>
             <a:fld id="{78C97017-6FC3-485B-9764-EAC9E56C1D49}" type="datetimeFigureOut">
               <a:rPr lang="en-US" smtClean="0"/>
-              <a:t>1/7/2017</a:t>
+              <a:t>3/20/2018</a:t>
             </a:fld>
             <a:endParaRPr lang="en-US"/>
           </a:p>
@@ -2604,7 +2604,7 @@
           <a:p>
             <a:fld id="{78C97017-6FC3-485B-9764-EAC9E56C1D49}" type="datetimeFigureOut">
               <a:rPr lang="en-US" smtClean="0"/>
-              <a:t>1/7/2017</a:t>
+              <a:t>3/20/2018</a:t>
             </a:fld>
             <a:endParaRPr lang="en-US"/>
           </a:p>
@@ -2856,7 +2856,7 @@
           <a:p>
             <a:fld id="{78C97017-6FC3-485B-9764-EAC9E56C1D49}" type="datetimeFigureOut">
               <a:rPr lang="en-US" smtClean="0"/>
-              <a:t>1/7/2017</a:t>
+              <a:t>3/20/2018</a:t>
             </a:fld>
             <a:endParaRPr lang="en-US"/>
           </a:p>
@@ -3067,7 +3067,7 @@
           <a:p>
             <a:fld id="{78C97017-6FC3-485B-9764-EAC9E56C1D49}" type="datetimeFigureOut">
               <a:rPr lang="en-US" smtClean="0"/>
-              <a:t>1/7/2017</a:t>
+              <a:t>3/20/2018</a:t>
             </a:fld>
             <a:endParaRPr lang="en-US"/>
           </a:p>
@@ -3450,8 +3450,8 @@
         </p:nvSpPr>
         <p:spPr>
           <a:xfrm>
-            <a:off x="1217465" y="1447800"/>
-            <a:ext cx="4917083" cy="3962400"/>
+            <a:off x="1217465" y="1447799"/>
+            <a:ext cx="4917083" cy="4876795"/>
           </a:xfrm>
           <a:prstGeom prst="roundRect">
             <a:avLst>
@@ -3726,54 +3726,6 @@
           </a:fontRef>
         </p:style>
       </p:cxnSp>
-      <p:sp>
-        <p:nvSpPr>
-          <p:cNvPr id="16" name="Isosceles Triangle 102"/>
-          <p:cNvSpPr/>
-          <p:nvPr/>
-        </p:nvSpPr>
-        <p:spPr>
-          <a:xfrm rot="10800000" flipV="1">
-            <a:off x="5394717" y="2110477"/>
-            <a:ext cx="270504" cy="175523"/>
-          </a:xfrm>
-          <a:prstGeom prst="triangle">
-            <a:avLst/>
-          </a:prstGeom>
-          <a:ln w="6350">
-            <a:solidFill>
-              <a:schemeClr val="accent3"/>
-            </a:solidFill>
-          </a:ln>
-          <a:effectLst/>
-        </p:spPr>
-        <p:style>
-          <a:lnRef idx="1">
-            <a:schemeClr val="accent3"/>
-          </a:lnRef>
-          <a:fillRef idx="2">
-            <a:schemeClr val="accent3"/>
-          </a:fillRef>
-          <a:effectRef idx="1">
-            <a:schemeClr val="accent3"/>
-          </a:effectRef>
-          <a:fontRef idx="minor">
-            <a:schemeClr val="dk1"/>
-          </a:fontRef>
-        </p:style>
-        <p:txBody>
-          <a:bodyPr rtlCol="0" anchor="ctr"/>
-          <a:lstStyle/>
-          <a:p>
-            <a:pPr algn="ctr"/>
-            <a:endParaRPr lang="en-SG" sz="1050" b="1">
-              <a:solidFill>
-                <a:srgbClr val="92D050"/>
-              </a:solidFill>
-            </a:endParaRPr>
-          </a:p>
-        </p:txBody>
-      </p:sp>
       <p:cxnSp>
         <p:nvCxnSpPr>
           <p:cNvPr id="19" name="Elbow Connector 122"/>
@@ -3945,7 +3897,7 @@
         </p:nvSpPr>
         <p:spPr>
           <a:xfrm>
-            <a:off x="2592527" y="4563759"/>
+            <a:off x="2592527" y="5562600"/>
             <a:ext cx="1093635" cy="236841"/>
           </a:xfrm>
           <a:prstGeom prst="rect">
@@ -4125,7 +4077,7 @@
         </p:nvSpPr>
         <p:spPr>
           <a:xfrm>
-            <a:off x="2592528" y="4966000"/>
+            <a:off x="2592528" y="5964841"/>
             <a:ext cx="1093635" cy="236841"/>
           </a:xfrm>
           <a:prstGeom prst="rect">
@@ -4419,8 +4371,8 @@
         </p:nvCxnSpPr>
         <p:spPr>
           <a:xfrm rot="16200000" flipH="1">
-            <a:off x="1597249" y="3686901"/>
-            <a:ext cx="1814155" cy="176401"/>
+            <a:off x="1097828" y="4186322"/>
+            <a:ext cx="2812996" cy="176401"/>
           </a:xfrm>
           <a:prstGeom prst="bentConnector2">
             <a:avLst/>
@@ -4453,14 +4405,15 @@
         <p:nvCxnSpPr>
           <p:cNvPr id="53" name="Elbow Connector 63"/>
           <p:cNvCxnSpPr>
+            <a:cxnSpLocks/>
             <a:endCxn id="38" idx="1"/>
           </p:cNvCxnSpPr>
           <p:nvPr/>
         </p:nvCxnSpPr>
         <p:spPr>
           <a:xfrm rot="16200000" flipH="1">
-            <a:off x="1184119" y="3676012"/>
-            <a:ext cx="2396440" cy="420377"/>
+            <a:off x="721507" y="4212241"/>
+            <a:ext cx="3395280" cy="346761"/>
           </a:xfrm>
           <a:prstGeom prst="bentConnector2">
             <a:avLst/>
@@ -4579,8 +4532,8 @@
         </p:nvCxnSpPr>
         <p:spPr>
           <a:xfrm flipV="1">
-            <a:off x="3686160" y="2286000"/>
-            <a:ext cx="1843809" cy="1136729"/>
+            <a:off x="3686160" y="2301581"/>
+            <a:ext cx="1843810" cy="1121148"/>
           </a:xfrm>
           <a:prstGeom prst="bentConnector2">
             <a:avLst/>
@@ -4613,15 +4566,16 @@
         <p:nvCxnSpPr>
           <p:cNvPr id="77" name="Elbow Connector 63"/>
           <p:cNvCxnSpPr>
-            <a:stCxn id="16" idx="3"/>
-            <a:endCxn id="37" idx="3"/>
+            <a:cxnSpLocks/>
+            <a:stCxn id="68" idx="2"/>
+            <a:endCxn id="36" idx="3"/>
           </p:cNvCxnSpPr>
           <p:nvPr/>
         </p:nvCxnSpPr>
         <p:spPr>
           <a:xfrm rot="5400000">
-            <a:off x="4174488" y="2991741"/>
-            <a:ext cx="2061222" cy="649740"/>
+            <a:off x="4653550" y="2722224"/>
+            <a:ext cx="420769" cy="2355545"/>
           </a:xfrm>
           <a:prstGeom prst="bentConnector2">
             <a:avLst/>
@@ -4661,8 +4615,8 @@
         </p:nvCxnSpPr>
         <p:spPr>
           <a:xfrm rot="5400000">
-            <a:off x="3867176" y="2104987"/>
-            <a:ext cx="1481780" cy="1843806"/>
+            <a:off x="3874968" y="2112777"/>
+            <a:ext cx="1466199" cy="1843807"/>
           </a:xfrm>
           <a:prstGeom prst="bentConnector2">
             <a:avLst/>
@@ -4702,8 +4656,8 @@
         </p:nvCxnSpPr>
         <p:spPr>
           <a:xfrm flipV="1">
-            <a:off x="3189583" y="2286000"/>
-            <a:ext cx="2340386" cy="228600"/>
+            <a:off x="3189583" y="2301581"/>
+            <a:ext cx="2340387" cy="213019"/>
           </a:xfrm>
           <a:prstGeom prst="bentConnector2">
             <a:avLst/>
@@ -4743,8 +4697,8 @@
         </p:nvCxnSpPr>
         <p:spPr>
           <a:xfrm rot="5400000">
-            <a:off x="3409976" y="2562187"/>
-            <a:ext cx="2396180" cy="1843807"/>
+            <a:off x="2918346" y="3069397"/>
+            <a:ext cx="3379440" cy="1843808"/>
           </a:xfrm>
           <a:prstGeom prst="bentConnector2">
             <a:avLst/>
@@ -4784,8 +4738,8 @@
         </p:nvCxnSpPr>
         <p:spPr>
           <a:xfrm rot="5400000">
-            <a:off x="3208856" y="2763307"/>
-            <a:ext cx="2798421" cy="1843806"/>
+            <a:off x="2717227" y="3270518"/>
+            <a:ext cx="3781681" cy="1843807"/>
           </a:xfrm>
           <a:prstGeom prst="bentConnector2">
             <a:avLst/>
@@ -5127,8 +5081,8 @@
         </p:nvCxnSpPr>
         <p:spPr>
           <a:xfrm rot="5400000">
-            <a:off x="4205956" y="1766207"/>
-            <a:ext cx="804221" cy="1843806"/>
+            <a:off x="4213747" y="1773998"/>
+            <a:ext cx="788640" cy="1843807"/>
           </a:xfrm>
           <a:prstGeom prst="bentConnector2">
             <a:avLst/>
@@ -5180,47 +5134,6 @@
             </a:solidFill>
             <a:headEnd type="none" w="med" len="med"/>
             <a:tailEnd type="arrow" w="med" len="med"/>
-          </a:ln>
-          <a:effectLst/>
-        </p:spPr>
-        <p:style>
-          <a:lnRef idx="1">
-            <a:schemeClr val="accent2"/>
-          </a:lnRef>
-          <a:fillRef idx="2">
-            <a:schemeClr val="accent2"/>
-          </a:fillRef>
-          <a:effectRef idx="1">
-            <a:schemeClr val="accent2"/>
-          </a:effectRef>
-          <a:fontRef idx="minor">
-            <a:schemeClr val="dk1"/>
-          </a:fontRef>
-        </p:style>
-      </p:cxnSp>
-      <p:cxnSp>
-        <p:nvCxnSpPr>
-          <p:cNvPr id="140" name="Elbow Connector 63"/>
-          <p:cNvCxnSpPr>
-            <a:stCxn id="16" idx="3"/>
-            <a:endCxn id="36" idx="3"/>
-          </p:cNvCxnSpPr>
-          <p:nvPr/>
-        </p:nvCxnSpPr>
-        <p:spPr>
-          <a:xfrm rot="5400000">
-            <a:off x="3695875" y="2276286"/>
-            <a:ext cx="1824381" cy="1843808"/>
-          </a:xfrm>
-          <a:prstGeom prst="bentConnector2">
-            <a:avLst/>
-          </a:prstGeom>
-          <a:ln w="6350">
-            <a:solidFill>
-              <a:schemeClr val="accent3"/>
-            </a:solidFill>
-            <a:headEnd type="none" w="med" len="med"/>
-            <a:tailEnd type="none" w="med" len="med"/>
           </a:ln>
           <a:effectLst/>
         </p:spPr>
@@ -5435,8 +5348,8 @@
         </p:nvSpPr>
         <p:spPr>
           <a:xfrm flipV="1">
-            <a:off x="4114799" y="4472708"/>
-            <a:ext cx="2642195" cy="101600"/>
+            <a:off x="4114800" y="4472708"/>
+            <a:ext cx="2620716" cy="69585"/>
           </a:xfrm>
           <a:custGeom>
             <a:avLst/>
@@ -5509,6 +5422,1264 @@
           </a:p>
         </p:txBody>
       </p:sp>
+      <p:sp>
+        <p:nvSpPr>
+          <p:cNvPr id="42" name="Rectangle 11">
+            <a:extLst>
+              <a:ext uri="{FF2B5EF4-FFF2-40B4-BE49-F238E27FC236}">
+                <a16:creationId xmlns:a16="http://schemas.microsoft.com/office/drawing/2014/main" id="{751D76F6-591F-42F9-A174-8AFB6BD94D5D}"/>
+              </a:ext>
+            </a:extLst>
+          </p:cNvPr>
+          <p:cNvSpPr/>
+          <p:nvPr/>
+        </p:nvSpPr>
+        <p:spPr>
+          <a:xfrm>
+            <a:off x="2589097" y="5012718"/>
+            <a:ext cx="1093635" cy="236841"/>
+          </a:xfrm>
+          <a:prstGeom prst="rect">
+            <a:avLst/>
+          </a:prstGeom>
+          <a:ln w="19050">
+            <a:solidFill>
+              <a:schemeClr val="accent3"/>
+            </a:solidFill>
+          </a:ln>
+          <a:effectLst/>
+        </p:spPr>
+        <p:style>
+          <a:lnRef idx="1">
+            <a:schemeClr val="accent3"/>
+          </a:lnRef>
+          <a:fillRef idx="2">
+            <a:schemeClr val="accent3"/>
+          </a:fillRef>
+          <a:effectRef idx="1">
+            <a:schemeClr val="accent3"/>
+          </a:effectRef>
+          <a:fontRef idx="minor">
+            <a:schemeClr val="dk1"/>
+          </a:fontRef>
+        </p:style>
+        <p:txBody>
+          <a:bodyPr rtlCol="0" anchor="ctr"/>
+          <a:lstStyle/>
+          <a:p>
+            <a:pPr algn="ctr"/>
+            <a:r>
+              <a:rPr lang="en-US" sz="900" b="1" dirty="0" err="1">
+                <a:solidFill>
+                  <a:schemeClr val="accent3">
+                    <a:lumMod val="75000"/>
+                  </a:schemeClr>
+                </a:solidFill>
+              </a:rPr>
+              <a:t>AttendeeListPanel</a:t>
+            </a:r>
+            <a:endParaRPr lang="en-SG" sz="900" b="1" dirty="0">
+              <a:solidFill>
+                <a:schemeClr val="accent3">
+                  <a:lumMod val="75000"/>
+                </a:schemeClr>
+              </a:solidFill>
+            </a:endParaRPr>
+          </a:p>
+        </p:txBody>
+      </p:sp>
+      <p:sp>
+        <p:nvSpPr>
+          <p:cNvPr id="45" name="Rectangle 11">
+            <a:extLst>
+              <a:ext uri="{FF2B5EF4-FFF2-40B4-BE49-F238E27FC236}">
+                <a16:creationId xmlns:a16="http://schemas.microsoft.com/office/drawing/2014/main" id="{450D0080-842A-436B-BD25-D9F4E9BAA9C1}"/>
+              </a:ext>
+            </a:extLst>
+          </p:cNvPr>
+          <p:cNvSpPr/>
+          <p:nvPr/>
+        </p:nvSpPr>
+        <p:spPr>
+          <a:xfrm>
+            <a:off x="3835894" y="5249559"/>
+            <a:ext cx="1040906" cy="236841"/>
+          </a:xfrm>
+          <a:prstGeom prst="rect">
+            <a:avLst/>
+          </a:prstGeom>
+          <a:ln w="19050">
+            <a:solidFill>
+              <a:schemeClr val="accent3"/>
+            </a:solidFill>
+          </a:ln>
+          <a:effectLst/>
+        </p:spPr>
+        <p:style>
+          <a:lnRef idx="1">
+            <a:schemeClr val="accent3"/>
+          </a:lnRef>
+          <a:fillRef idx="2">
+            <a:schemeClr val="accent3"/>
+          </a:fillRef>
+          <a:effectRef idx="1">
+            <a:schemeClr val="accent3"/>
+          </a:effectRef>
+          <a:fontRef idx="minor">
+            <a:schemeClr val="dk1"/>
+          </a:fontRef>
+        </p:style>
+        <p:txBody>
+          <a:bodyPr rtlCol="0" anchor="ctr"/>
+          <a:lstStyle/>
+          <a:p>
+            <a:pPr algn="ctr"/>
+            <a:r>
+              <a:rPr lang="en-US" sz="1050" b="1" dirty="0" err="1">
+                <a:solidFill>
+                  <a:schemeClr val="accent3">
+                    <a:lumMod val="75000"/>
+                  </a:schemeClr>
+                </a:solidFill>
+              </a:rPr>
+              <a:t>AttendeeCard</a:t>
+            </a:r>
+            <a:endParaRPr lang="en-SG" sz="1050" b="1" dirty="0">
+              <a:solidFill>
+                <a:schemeClr val="accent3">
+                  <a:lumMod val="75000"/>
+                </a:schemeClr>
+              </a:solidFill>
+            </a:endParaRPr>
+          </a:p>
+        </p:txBody>
+      </p:sp>
+      <p:cxnSp>
+        <p:nvCxnSpPr>
+          <p:cNvPr id="46" name="Elbow Connector 136">
+            <a:extLst>
+              <a:ext uri="{FF2B5EF4-FFF2-40B4-BE49-F238E27FC236}">
+                <a16:creationId xmlns:a16="http://schemas.microsoft.com/office/drawing/2014/main" id="{9FFFA689-61D0-4CBD-9CA7-427988351A76}"/>
+              </a:ext>
+            </a:extLst>
+          </p:cNvPr>
+          <p:cNvCxnSpPr>
+            <a:stCxn id="42" idx="2"/>
+            <a:endCxn id="45" idx="1"/>
+          </p:cNvCxnSpPr>
+          <p:nvPr/>
+        </p:nvCxnSpPr>
+        <p:spPr>
+          <a:xfrm rot="16200000" flipH="1">
+            <a:off x="3426694" y="4958779"/>
+            <a:ext cx="118421" cy="699979"/>
+          </a:xfrm>
+          <a:prstGeom prst="bentConnector2">
+            <a:avLst/>
+          </a:prstGeom>
+          <a:ln w="19050">
+            <a:solidFill>
+              <a:schemeClr val="accent3"/>
+            </a:solidFill>
+            <a:headEnd type="none" w="med" len="med"/>
+            <a:tailEnd type="arrow" w="med" len="med"/>
+          </a:ln>
+          <a:effectLst/>
+        </p:spPr>
+        <p:style>
+          <a:lnRef idx="1">
+            <a:schemeClr val="accent2"/>
+          </a:lnRef>
+          <a:fillRef idx="2">
+            <a:schemeClr val="accent2"/>
+          </a:fillRef>
+          <a:effectRef idx="1">
+            <a:schemeClr val="accent2"/>
+          </a:effectRef>
+          <a:fontRef idx="minor">
+            <a:schemeClr val="dk1"/>
+          </a:fontRef>
+        </p:style>
+      </p:cxnSp>
+      <p:sp>
+        <p:nvSpPr>
+          <p:cNvPr id="48" name="Rectangle 11">
+            <a:extLst>
+              <a:ext uri="{FF2B5EF4-FFF2-40B4-BE49-F238E27FC236}">
+                <a16:creationId xmlns:a16="http://schemas.microsoft.com/office/drawing/2014/main" id="{415CA7B0-98EA-485C-85D0-41AC0E6BACAA}"/>
+              </a:ext>
+            </a:extLst>
+          </p:cNvPr>
+          <p:cNvSpPr/>
+          <p:nvPr/>
+        </p:nvSpPr>
+        <p:spPr>
+          <a:xfrm>
+            <a:off x="2590800" y="4479318"/>
+            <a:ext cx="1093635" cy="236841"/>
+          </a:xfrm>
+          <a:prstGeom prst="rect">
+            <a:avLst/>
+          </a:prstGeom>
+          <a:ln w="19050">
+            <a:solidFill>
+              <a:schemeClr val="accent3"/>
+            </a:solidFill>
+          </a:ln>
+          <a:effectLst/>
+        </p:spPr>
+        <p:style>
+          <a:lnRef idx="1">
+            <a:schemeClr val="accent3"/>
+          </a:lnRef>
+          <a:fillRef idx="2">
+            <a:schemeClr val="accent3"/>
+          </a:fillRef>
+          <a:effectRef idx="1">
+            <a:schemeClr val="accent3"/>
+          </a:effectRef>
+          <a:fontRef idx="minor">
+            <a:schemeClr val="dk1"/>
+          </a:fontRef>
+        </p:style>
+        <p:txBody>
+          <a:bodyPr rtlCol="0" anchor="ctr"/>
+          <a:lstStyle/>
+          <a:p>
+            <a:pPr algn="ctr"/>
+            <a:r>
+              <a:rPr lang="en-US" sz="900" b="1" dirty="0" err="1">
+                <a:solidFill>
+                  <a:schemeClr val="accent3">
+                    <a:lumMod val="75000"/>
+                  </a:schemeClr>
+                </a:solidFill>
+              </a:rPr>
+              <a:t>EpicEventListPanel</a:t>
+            </a:r>
+            <a:endParaRPr lang="en-SG" sz="900" b="1" dirty="0">
+              <a:solidFill>
+                <a:schemeClr val="accent3">
+                  <a:lumMod val="75000"/>
+                </a:schemeClr>
+              </a:solidFill>
+            </a:endParaRPr>
+          </a:p>
+        </p:txBody>
+      </p:sp>
+      <p:sp>
+        <p:nvSpPr>
+          <p:cNvPr id="49" name="Rectangle 11">
+            <a:extLst>
+              <a:ext uri="{FF2B5EF4-FFF2-40B4-BE49-F238E27FC236}">
+                <a16:creationId xmlns:a16="http://schemas.microsoft.com/office/drawing/2014/main" id="{DE99AAC9-D13E-4BEB-A6A2-71F95C20ABC6}"/>
+              </a:ext>
+            </a:extLst>
+          </p:cNvPr>
+          <p:cNvSpPr/>
+          <p:nvPr/>
+        </p:nvSpPr>
+        <p:spPr>
+          <a:xfrm>
+            <a:off x="3837597" y="4716159"/>
+            <a:ext cx="1040906" cy="236841"/>
+          </a:xfrm>
+          <a:prstGeom prst="rect">
+            <a:avLst/>
+          </a:prstGeom>
+          <a:ln w="19050">
+            <a:solidFill>
+              <a:schemeClr val="accent3"/>
+            </a:solidFill>
+          </a:ln>
+          <a:effectLst/>
+        </p:spPr>
+        <p:style>
+          <a:lnRef idx="1">
+            <a:schemeClr val="accent3"/>
+          </a:lnRef>
+          <a:fillRef idx="2">
+            <a:schemeClr val="accent3"/>
+          </a:fillRef>
+          <a:effectRef idx="1">
+            <a:schemeClr val="accent3"/>
+          </a:effectRef>
+          <a:fontRef idx="minor">
+            <a:schemeClr val="dk1"/>
+          </a:fontRef>
+        </p:style>
+        <p:txBody>
+          <a:bodyPr rtlCol="0" anchor="ctr"/>
+          <a:lstStyle/>
+          <a:p>
+            <a:pPr algn="ctr"/>
+            <a:r>
+              <a:rPr lang="en-US" sz="1050" b="1" dirty="0" err="1">
+                <a:solidFill>
+                  <a:schemeClr val="accent3">
+                    <a:lumMod val="75000"/>
+                  </a:schemeClr>
+                </a:solidFill>
+              </a:rPr>
+              <a:t>EpicEventCard</a:t>
+            </a:r>
+            <a:endParaRPr lang="en-SG" sz="1050" b="1" dirty="0">
+              <a:solidFill>
+                <a:schemeClr val="accent3">
+                  <a:lumMod val="75000"/>
+                </a:schemeClr>
+              </a:solidFill>
+            </a:endParaRPr>
+          </a:p>
+        </p:txBody>
+      </p:sp>
+      <p:cxnSp>
+        <p:nvCxnSpPr>
+          <p:cNvPr id="51" name="Elbow Connector 136">
+            <a:extLst>
+              <a:ext uri="{FF2B5EF4-FFF2-40B4-BE49-F238E27FC236}">
+                <a16:creationId xmlns:a16="http://schemas.microsoft.com/office/drawing/2014/main" id="{2FF0A16A-55B4-4446-B79A-796E4F55330D}"/>
+              </a:ext>
+            </a:extLst>
+          </p:cNvPr>
+          <p:cNvCxnSpPr>
+            <a:stCxn id="48" idx="2"/>
+            <a:endCxn id="49" idx="1"/>
+          </p:cNvCxnSpPr>
+          <p:nvPr/>
+        </p:nvCxnSpPr>
+        <p:spPr>
+          <a:xfrm rot="16200000" flipH="1">
+            <a:off x="3428397" y="4425379"/>
+            <a:ext cx="118421" cy="699979"/>
+          </a:xfrm>
+          <a:prstGeom prst="bentConnector2">
+            <a:avLst/>
+          </a:prstGeom>
+          <a:ln w="19050">
+            <a:solidFill>
+              <a:schemeClr val="accent3"/>
+            </a:solidFill>
+            <a:headEnd type="none" w="med" len="med"/>
+            <a:tailEnd type="arrow" w="med" len="med"/>
+          </a:ln>
+          <a:effectLst/>
+        </p:spPr>
+        <p:style>
+          <a:lnRef idx="1">
+            <a:schemeClr val="accent2"/>
+          </a:lnRef>
+          <a:fillRef idx="2">
+            <a:schemeClr val="accent2"/>
+          </a:fillRef>
+          <a:effectRef idx="1">
+            <a:schemeClr val="accent2"/>
+          </a:effectRef>
+          <a:fontRef idx="minor">
+            <a:schemeClr val="dk1"/>
+          </a:fontRef>
+        </p:style>
+      </p:cxnSp>
+      <p:cxnSp>
+        <p:nvCxnSpPr>
+          <p:cNvPr id="52" name="Elbow Connector 63">
+            <a:extLst>
+              <a:ext uri="{FF2B5EF4-FFF2-40B4-BE49-F238E27FC236}">
+                <a16:creationId xmlns:a16="http://schemas.microsoft.com/office/drawing/2014/main" id="{A4609608-AB23-4305-A7D9-93D5326161F0}"/>
+              </a:ext>
+            </a:extLst>
+          </p:cNvPr>
+          <p:cNvCxnSpPr>
+            <a:cxnSpLocks/>
+            <a:endCxn id="48" idx="1"/>
+          </p:cNvCxnSpPr>
+          <p:nvPr/>
+        </p:nvCxnSpPr>
+        <p:spPr>
+          <a:xfrm rot="16200000" flipH="1">
+            <a:off x="1645855" y="3652794"/>
+            <a:ext cx="1713488" cy="176402"/>
+          </a:xfrm>
+          <a:prstGeom prst="bentConnector2">
+            <a:avLst/>
+          </a:prstGeom>
+          <a:ln w="19050">
+            <a:solidFill>
+              <a:schemeClr val="accent3"/>
+            </a:solidFill>
+            <a:headEnd type="none" w="med" len="med"/>
+            <a:tailEnd type="arrow" w="med" len="med"/>
+          </a:ln>
+          <a:effectLst/>
+        </p:spPr>
+        <p:style>
+          <a:lnRef idx="1">
+            <a:schemeClr val="accent2"/>
+          </a:lnRef>
+          <a:fillRef idx="2">
+            <a:schemeClr val="accent2"/>
+          </a:fillRef>
+          <a:effectRef idx="1">
+            <a:schemeClr val="accent2"/>
+          </a:effectRef>
+          <a:fontRef idx="minor">
+            <a:schemeClr val="dk1"/>
+          </a:fontRef>
+        </p:style>
+      </p:cxnSp>
+      <p:cxnSp>
+        <p:nvCxnSpPr>
+          <p:cNvPr id="54" name="Elbow Connector 63">
+            <a:extLst>
+              <a:ext uri="{FF2B5EF4-FFF2-40B4-BE49-F238E27FC236}">
+                <a16:creationId xmlns:a16="http://schemas.microsoft.com/office/drawing/2014/main" id="{B7D064EF-C8AD-40BA-A4F9-97C59A037536}"/>
+              </a:ext>
+            </a:extLst>
+          </p:cNvPr>
+          <p:cNvCxnSpPr>
+            <a:cxnSpLocks/>
+            <a:stCxn id="39" idx="2"/>
+            <a:endCxn id="42" idx="1"/>
+          </p:cNvCxnSpPr>
+          <p:nvPr/>
+        </p:nvCxnSpPr>
+        <p:spPr>
+          <a:xfrm rot="16200000" flipH="1">
+            <a:off x="1371054" y="3913096"/>
+            <a:ext cx="2263114" cy="172971"/>
+          </a:xfrm>
+          <a:prstGeom prst="bentConnector2">
+            <a:avLst/>
+          </a:prstGeom>
+          <a:ln w="19050">
+            <a:solidFill>
+              <a:schemeClr val="accent3"/>
+            </a:solidFill>
+            <a:headEnd type="none" w="med" len="med"/>
+            <a:tailEnd type="arrow" w="med" len="med"/>
+          </a:ln>
+          <a:effectLst/>
+        </p:spPr>
+        <p:style>
+          <a:lnRef idx="1">
+            <a:schemeClr val="accent2"/>
+          </a:lnRef>
+          <a:fillRef idx="2">
+            <a:schemeClr val="accent2"/>
+          </a:fillRef>
+          <a:effectRef idx="1">
+            <a:schemeClr val="accent2"/>
+          </a:effectRef>
+          <a:fontRef idx="minor">
+            <a:schemeClr val="dk1"/>
+          </a:fontRef>
+        </p:style>
+      </p:cxnSp>
+      <p:cxnSp>
+        <p:nvCxnSpPr>
+          <p:cNvPr id="58" name="Elbow Connector 63">
+            <a:extLst>
+              <a:ext uri="{FF2B5EF4-FFF2-40B4-BE49-F238E27FC236}">
+                <a16:creationId xmlns:a16="http://schemas.microsoft.com/office/drawing/2014/main" id="{4E9DF131-A3AF-4CD5-A6EF-C1740CB88A54}"/>
+              </a:ext>
+            </a:extLst>
+          </p:cNvPr>
+          <p:cNvCxnSpPr>
+            <a:cxnSpLocks/>
+            <a:stCxn id="68" idx="2"/>
+            <a:endCxn id="48" idx="3"/>
+          </p:cNvCxnSpPr>
+          <p:nvPr/>
+        </p:nvCxnSpPr>
+        <p:spPr>
+          <a:xfrm rot="5400000">
+            <a:off x="4409008" y="2965040"/>
+            <a:ext cx="908127" cy="2357271"/>
+          </a:xfrm>
+          <a:prstGeom prst="bentConnector2">
+            <a:avLst/>
+          </a:prstGeom>
+          <a:ln w="6350">
+            <a:solidFill>
+              <a:schemeClr val="accent3"/>
+            </a:solidFill>
+            <a:headEnd type="none" w="med" len="med"/>
+            <a:tailEnd type="none" w="med" len="med"/>
+          </a:ln>
+          <a:effectLst/>
+        </p:spPr>
+        <p:style>
+          <a:lnRef idx="1">
+            <a:schemeClr val="accent2"/>
+          </a:lnRef>
+          <a:fillRef idx="2">
+            <a:schemeClr val="accent2"/>
+          </a:fillRef>
+          <a:effectRef idx="1">
+            <a:schemeClr val="accent2"/>
+          </a:effectRef>
+          <a:fontRef idx="minor">
+            <a:schemeClr val="dk1"/>
+          </a:fontRef>
+        </p:style>
+      </p:cxnSp>
+      <p:sp>
+        <p:nvSpPr>
+          <p:cNvPr id="65" name="Freeform 117">
+            <a:extLst>
+              <a:ext uri="{FF2B5EF4-FFF2-40B4-BE49-F238E27FC236}">
+                <a16:creationId xmlns:a16="http://schemas.microsoft.com/office/drawing/2014/main" id="{0C7799CE-C8D8-40E6-8480-31B29960C969}"/>
+              </a:ext>
+            </a:extLst>
+          </p:cNvPr>
+          <p:cNvSpPr/>
+          <p:nvPr/>
+        </p:nvSpPr>
+        <p:spPr>
+          <a:xfrm flipV="1">
+            <a:off x="4088996" y="4930278"/>
+            <a:ext cx="2646519" cy="86860"/>
+          </a:xfrm>
+          <a:custGeom>
+            <a:avLst/>
+            <a:gdLst>
+              <a:gd name="connsiteX0" fmla="*/ 0 w 3048000"/>
+              <a:gd name="connsiteY0" fmla="*/ 203200 h 203200"/>
+              <a:gd name="connsiteX1" fmla="*/ 221673 w 3048000"/>
+              <a:gd name="connsiteY1" fmla="*/ 0 h 203200"/>
+              <a:gd name="connsiteX2" fmla="*/ 3048000 w 3048000"/>
+              <a:gd name="connsiteY2" fmla="*/ 0 h 203200"/>
+            </a:gdLst>
+            <a:ahLst/>
+            <a:cxnLst>
+              <a:cxn ang="0">
+                <a:pos x="connsiteX0" y="connsiteY0"/>
+              </a:cxn>
+              <a:cxn ang="0">
+                <a:pos x="connsiteX1" y="connsiteY1"/>
+              </a:cxn>
+              <a:cxn ang="0">
+                <a:pos x="connsiteX2" y="connsiteY2"/>
+              </a:cxn>
+            </a:cxnLst>
+            <a:rect l="l" t="t" r="r" b="b"/>
+            <a:pathLst>
+              <a:path w="3048000" h="203200">
+                <a:moveTo>
+                  <a:pt x="0" y="203200"/>
+                </a:moveTo>
+                <a:lnTo>
+                  <a:pt x="221673" y="0"/>
+                </a:lnTo>
+                <a:lnTo>
+                  <a:pt x="3048000" y="0"/>
+                </a:lnTo>
+              </a:path>
+            </a:pathLst>
+          </a:custGeom>
+          <a:noFill/>
+          <a:ln w="19050">
+            <a:solidFill>
+              <a:schemeClr val="accent3"/>
+            </a:solidFill>
+            <a:prstDash val="sysDot"/>
+            <a:headEnd type="none" w="med" len="med"/>
+            <a:tailEnd type="arrow" w="med" len="med"/>
+          </a:ln>
+          <a:effectLst/>
+        </p:spPr>
+        <p:style>
+          <a:lnRef idx="1">
+            <a:schemeClr val="accent2"/>
+          </a:lnRef>
+          <a:fillRef idx="2">
+            <a:schemeClr val="accent2"/>
+          </a:fillRef>
+          <a:effectRef idx="1">
+            <a:schemeClr val="accent2"/>
+          </a:effectRef>
+          <a:fontRef idx="minor">
+            <a:schemeClr val="dk1"/>
+          </a:fontRef>
+        </p:style>
+        <p:txBody>
+          <a:bodyPr rtlCol="0" anchor="ctr"/>
+          <a:lstStyle/>
+          <a:p>
+            <a:pPr algn="ctr"/>
+            <a:endParaRPr lang="en-SG"/>
+          </a:p>
+        </p:txBody>
+      </p:sp>
+      <p:sp>
+        <p:nvSpPr>
+          <p:cNvPr id="66" name="Freeform 117">
+            <a:extLst>
+              <a:ext uri="{FF2B5EF4-FFF2-40B4-BE49-F238E27FC236}">
+                <a16:creationId xmlns:a16="http://schemas.microsoft.com/office/drawing/2014/main" id="{C88CEAEE-86A1-49E9-B60D-69CF14D49C13}"/>
+              </a:ext>
+            </a:extLst>
+          </p:cNvPr>
+          <p:cNvSpPr/>
+          <p:nvPr/>
+        </p:nvSpPr>
+        <p:spPr>
+          <a:xfrm>
+            <a:off x="4343400" y="5191004"/>
+            <a:ext cx="2392680" cy="45719"/>
+          </a:xfrm>
+          <a:custGeom>
+            <a:avLst/>
+            <a:gdLst>
+              <a:gd name="connsiteX0" fmla="*/ 0 w 3048000"/>
+              <a:gd name="connsiteY0" fmla="*/ 203200 h 203200"/>
+              <a:gd name="connsiteX1" fmla="*/ 221673 w 3048000"/>
+              <a:gd name="connsiteY1" fmla="*/ 0 h 203200"/>
+              <a:gd name="connsiteX2" fmla="*/ 3048000 w 3048000"/>
+              <a:gd name="connsiteY2" fmla="*/ 0 h 203200"/>
+            </a:gdLst>
+            <a:ahLst/>
+            <a:cxnLst>
+              <a:cxn ang="0">
+                <a:pos x="connsiteX0" y="connsiteY0"/>
+              </a:cxn>
+              <a:cxn ang="0">
+                <a:pos x="connsiteX1" y="connsiteY1"/>
+              </a:cxn>
+              <a:cxn ang="0">
+                <a:pos x="connsiteX2" y="connsiteY2"/>
+              </a:cxn>
+            </a:cxnLst>
+            <a:rect l="l" t="t" r="r" b="b"/>
+            <a:pathLst>
+              <a:path w="3048000" h="203200">
+                <a:moveTo>
+                  <a:pt x="0" y="203200"/>
+                </a:moveTo>
+                <a:lnTo>
+                  <a:pt x="221673" y="0"/>
+                </a:lnTo>
+                <a:lnTo>
+                  <a:pt x="3048000" y="0"/>
+                </a:lnTo>
+              </a:path>
+            </a:pathLst>
+          </a:custGeom>
+          <a:noFill/>
+          <a:ln w="19050">
+            <a:solidFill>
+              <a:schemeClr val="accent3"/>
+            </a:solidFill>
+            <a:prstDash val="sysDot"/>
+            <a:headEnd type="none" w="med" len="med"/>
+            <a:tailEnd type="arrow" w="med" len="med"/>
+          </a:ln>
+          <a:effectLst/>
+        </p:spPr>
+        <p:style>
+          <a:lnRef idx="1">
+            <a:schemeClr val="accent2"/>
+          </a:lnRef>
+          <a:fillRef idx="2">
+            <a:schemeClr val="accent2"/>
+          </a:fillRef>
+          <a:effectRef idx="1">
+            <a:schemeClr val="accent2"/>
+          </a:effectRef>
+          <a:fontRef idx="minor">
+            <a:schemeClr val="dk1"/>
+          </a:fontRef>
+        </p:style>
+        <p:txBody>
+          <a:bodyPr rtlCol="0" anchor="ctr"/>
+          <a:lstStyle/>
+          <a:p>
+            <a:pPr algn="ctr"/>
+            <a:endParaRPr lang="en-SG"/>
+          </a:p>
+        </p:txBody>
+      </p:sp>
+      <p:sp>
+        <p:nvSpPr>
+          <p:cNvPr id="16" name="Isosceles Triangle 102"/>
+          <p:cNvSpPr/>
+          <p:nvPr/>
+        </p:nvSpPr>
+        <p:spPr>
+          <a:xfrm rot="10800000" flipV="1">
+            <a:off x="5394718" y="2126058"/>
+            <a:ext cx="270504" cy="175523"/>
+          </a:xfrm>
+          <a:prstGeom prst="triangle">
+            <a:avLst/>
+          </a:prstGeom>
+          <a:ln w="6350">
+            <a:solidFill>
+              <a:schemeClr val="accent3"/>
+            </a:solidFill>
+          </a:ln>
+          <a:effectLst/>
+        </p:spPr>
+        <p:style>
+          <a:lnRef idx="1">
+            <a:schemeClr val="accent3"/>
+          </a:lnRef>
+          <a:fillRef idx="2">
+            <a:schemeClr val="accent3"/>
+          </a:fillRef>
+          <a:effectRef idx="1">
+            <a:schemeClr val="accent3"/>
+          </a:effectRef>
+          <a:fontRef idx="minor">
+            <a:schemeClr val="dk1"/>
+          </a:fontRef>
+        </p:style>
+        <p:txBody>
+          <a:bodyPr rtlCol="0" anchor="ctr"/>
+          <a:lstStyle/>
+          <a:p>
+            <a:pPr algn="ctr"/>
+            <a:endParaRPr lang="en-SG" sz="1050" b="1">
+              <a:solidFill>
+                <a:srgbClr val="92D050"/>
+              </a:solidFill>
+            </a:endParaRPr>
+          </a:p>
+        </p:txBody>
+      </p:sp>
+      <p:sp>
+        <p:nvSpPr>
+          <p:cNvPr id="68" name="Rectangle 62">
+            <a:extLst>
+              <a:ext uri="{FF2B5EF4-FFF2-40B4-BE49-F238E27FC236}">
+                <a16:creationId xmlns:a16="http://schemas.microsoft.com/office/drawing/2014/main" id="{158A8910-028B-470D-B0AE-808E181993F3}"/>
+              </a:ext>
+            </a:extLst>
+          </p:cNvPr>
+          <p:cNvSpPr/>
+          <p:nvPr/>
+        </p:nvSpPr>
+        <p:spPr>
+          <a:xfrm>
+            <a:off x="5655684" y="3342852"/>
+            <a:ext cx="772043" cy="346760"/>
+          </a:xfrm>
+          <a:prstGeom prst="rect">
+            <a:avLst/>
+          </a:prstGeom>
+          <a:ln w="6350">
+            <a:solidFill>
+              <a:schemeClr val="accent3"/>
+            </a:solidFill>
+          </a:ln>
+          <a:effectLst/>
+        </p:spPr>
+        <p:style>
+          <a:lnRef idx="1">
+            <a:schemeClr val="accent3"/>
+          </a:lnRef>
+          <a:fillRef idx="2">
+            <a:schemeClr val="accent3"/>
+          </a:fillRef>
+          <a:effectRef idx="1">
+            <a:schemeClr val="accent3"/>
+          </a:effectRef>
+          <a:fontRef idx="minor">
+            <a:schemeClr val="dk1"/>
+          </a:fontRef>
+        </p:style>
+        <p:txBody>
+          <a:bodyPr rtlCol="0" anchor="ctr"/>
+          <a:lstStyle/>
+          <a:p>
+            <a:pPr algn="ctr"/>
+            <a:r>
+              <a:rPr lang="en-SG" sz="1050" b="1" dirty="0" err="1">
+                <a:solidFill>
+                  <a:schemeClr val="accent3">
+                    <a:lumMod val="75000"/>
+                  </a:schemeClr>
+                </a:solidFill>
+              </a:rPr>
+              <a:t>ListPanel</a:t>
+            </a:r>
+            <a:endParaRPr lang="en-SG" sz="1050" b="1" dirty="0">
+              <a:solidFill>
+                <a:schemeClr val="accent3">
+                  <a:lumMod val="75000"/>
+                </a:schemeClr>
+              </a:solidFill>
+            </a:endParaRPr>
+          </a:p>
+        </p:txBody>
+      </p:sp>
+      <p:sp>
+        <p:nvSpPr>
+          <p:cNvPr id="70" name="Isosceles Triangle 102">
+            <a:extLst>
+              <a:ext uri="{FF2B5EF4-FFF2-40B4-BE49-F238E27FC236}">
+                <a16:creationId xmlns:a16="http://schemas.microsoft.com/office/drawing/2014/main" id="{81D68C7B-BE82-46A0-80B2-FD4D7C5326A0}"/>
+              </a:ext>
+            </a:extLst>
+          </p:cNvPr>
+          <p:cNvSpPr/>
+          <p:nvPr/>
+        </p:nvSpPr>
+        <p:spPr>
+          <a:xfrm rot="10800000" flipV="1">
+            <a:off x="5903811" y="3687955"/>
+            <a:ext cx="270504" cy="175523"/>
+          </a:xfrm>
+          <a:prstGeom prst="triangle">
+            <a:avLst/>
+          </a:prstGeom>
+          <a:ln w="6350">
+            <a:solidFill>
+              <a:schemeClr val="accent3"/>
+            </a:solidFill>
+          </a:ln>
+          <a:effectLst/>
+        </p:spPr>
+        <p:style>
+          <a:lnRef idx="1">
+            <a:schemeClr val="accent3"/>
+          </a:lnRef>
+          <a:fillRef idx="2">
+            <a:schemeClr val="accent3"/>
+          </a:fillRef>
+          <a:effectRef idx="1">
+            <a:schemeClr val="accent3"/>
+          </a:effectRef>
+          <a:fontRef idx="minor">
+            <a:schemeClr val="dk1"/>
+          </a:fontRef>
+        </p:style>
+        <p:txBody>
+          <a:bodyPr rtlCol="0" anchor="ctr"/>
+          <a:lstStyle/>
+          <a:p>
+            <a:pPr algn="ctr"/>
+            <a:endParaRPr lang="en-SG" sz="1050" b="1">
+              <a:solidFill>
+                <a:srgbClr val="92D050"/>
+              </a:solidFill>
+            </a:endParaRPr>
+          </a:p>
+        </p:txBody>
+      </p:sp>
+      <p:cxnSp>
+        <p:nvCxnSpPr>
+          <p:cNvPr id="75" name="Elbow Connector 63">
+            <a:extLst>
+              <a:ext uri="{FF2B5EF4-FFF2-40B4-BE49-F238E27FC236}">
+                <a16:creationId xmlns:a16="http://schemas.microsoft.com/office/drawing/2014/main" id="{FF00DB2F-7B14-429E-8820-79599944AF4B}"/>
+              </a:ext>
+            </a:extLst>
+          </p:cNvPr>
+          <p:cNvCxnSpPr>
+            <a:cxnSpLocks/>
+            <a:stCxn id="16" idx="3"/>
+            <a:endCxn id="68" idx="0"/>
+          </p:cNvCxnSpPr>
+          <p:nvPr/>
+        </p:nvCxnSpPr>
+        <p:spPr>
+          <a:xfrm rot="16200000" flipH="1">
+            <a:off x="5265203" y="2566348"/>
+            <a:ext cx="1041271" cy="511736"/>
+          </a:xfrm>
+          <a:prstGeom prst="bentConnector3">
+            <a:avLst>
+              <a:gd name="adj1" fmla="val 36584"/>
+            </a:avLst>
+          </a:prstGeom>
+          <a:ln w="6350">
+            <a:solidFill>
+              <a:schemeClr val="accent3"/>
+            </a:solidFill>
+            <a:headEnd type="none" w="med" len="med"/>
+            <a:tailEnd type="none" w="med" len="med"/>
+          </a:ln>
+          <a:effectLst/>
+        </p:spPr>
+        <p:style>
+          <a:lnRef idx="1">
+            <a:schemeClr val="accent2"/>
+          </a:lnRef>
+          <a:fillRef idx="2">
+            <a:schemeClr val="accent2"/>
+          </a:fillRef>
+          <a:effectRef idx="1">
+            <a:schemeClr val="accent2"/>
+          </a:effectRef>
+          <a:fontRef idx="minor">
+            <a:schemeClr val="dk1"/>
+          </a:fontRef>
+        </p:style>
+      </p:cxnSp>
+      <p:sp>
+        <p:nvSpPr>
+          <p:cNvPr id="92" name="Rectangle 11">
+            <a:extLst>
+              <a:ext uri="{FF2B5EF4-FFF2-40B4-BE49-F238E27FC236}">
+                <a16:creationId xmlns:a16="http://schemas.microsoft.com/office/drawing/2014/main" id="{C4C6B5B6-F291-4677-9889-5BDD1146FCE6}"/>
+              </a:ext>
+            </a:extLst>
+          </p:cNvPr>
+          <p:cNvSpPr/>
+          <p:nvPr/>
+        </p:nvSpPr>
+        <p:spPr>
+          <a:xfrm>
+            <a:off x="5913026" y="5638795"/>
+            <a:ext cx="1040906" cy="236841"/>
+          </a:xfrm>
+          <a:prstGeom prst="rect">
+            <a:avLst/>
+          </a:prstGeom>
+          <a:ln w="19050">
+            <a:solidFill>
+              <a:schemeClr val="accent3"/>
+            </a:solidFill>
+          </a:ln>
+          <a:effectLst/>
+        </p:spPr>
+        <p:style>
+          <a:lnRef idx="1">
+            <a:schemeClr val="accent3"/>
+          </a:lnRef>
+          <a:fillRef idx="2">
+            <a:schemeClr val="accent3"/>
+          </a:fillRef>
+          <a:effectRef idx="1">
+            <a:schemeClr val="accent3"/>
+          </a:effectRef>
+          <a:fontRef idx="minor">
+            <a:schemeClr val="dk1"/>
+          </a:fontRef>
+        </p:style>
+        <p:txBody>
+          <a:bodyPr rtlCol="0" anchor="ctr"/>
+          <a:lstStyle/>
+          <a:p>
+            <a:pPr algn="ctr"/>
+            <a:r>
+              <a:rPr lang="en-US" sz="1050" b="1" dirty="0">
+                <a:solidFill>
+                  <a:schemeClr val="accent3">
+                    <a:lumMod val="75000"/>
+                  </a:schemeClr>
+                </a:solidFill>
+              </a:rPr>
+              <a:t>Card</a:t>
+            </a:r>
+            <a:endParaRPr lang="en-SG" sz="1050" b="1" dirty="0">
+              <a:solidFill>
+                <a:schemeClr val="accent3">
+                  <a:lumMod val="75000"/>
+                </a:schemeClr>
+              </a:solidFill>
+            </a:endParaRPr>
+          </a:p>
+        </p:txBody>
+      </p:sp>
+      <p:cxnSp>
+        <p:nvCxnSpPr>
+          <p:cNvPr id="95" name="Elbow Connector 63">
+            <a:extLst>
+              <a:ext uri="{FF2B5EF4-FFF2-40B4-BE49-F238E27FC236}">
+                <a16:creationId xmlns:a16="http://schemas.microsoft.com/office/drawing/2014/main" id="{5834042E-AC6C-4042-A0B6-4985C7531BFD}"/>
+              </a:ext>
+            </a:extLst>
+          </p:cNvPr>
+          <p:cNvCxnSpPr>
+            <a:cxnSpLocks/>
+            <a:stCxn id="70" idx="3"/>
+            <a:endCxn id="42" idx="3"/>
+          </p:cNvCxnSpPr>
+          <p:nvPr/>
+        </p:nvCxnSpPr>
+        <p:spPr>
+          <a:xfrm rot="5400000">
+            <a:off x="4227068" y="3319143"/>
+            <a:ext cx="1267661" cy="2356331"/>
+          </a:xfrm>
+          <a:prstGeom prst="bentConnector2">
+            <a:avLst/>
+          </a:prstGeom>
+          <a:ln w="6350">
+            <a:solidFill>
+              <a:schemeClr val="accent3"/>
+            </a:solidFill>
+            <a:headEnd type="none" w="med" len="med"/>
+            <a:tailEnd type="none" w="med" len="med"/>
+          </a:ln>
+          <a:effectLst/>
+        </p:spPr>
+        <p:style>
+          <a:lnRef idx="1">
+            <a:schemeClr val="accent2"/>
+          </a:lnRef>
+          <a:fillRef idx="2">
+            <a:schemeClr val="accent2"/>
+          </a:fillRef>
+          <a:effectRef idx="1">
+            <a:schemeClr val="accent2"/>
+          </a:effectRef>
+          <a:fontRef idx="minor">
+            <a:schemeClr val="dk1"/>
+          </a:fontRef>
+        </p:style>
+      </p:cxnSp>
+      <p:cxnSp>
+        <p:nvCxnSpPr>
+          <p:cNvPr id="98" name="Elbow Connector 63">
+            <a:extLst>
+              <a:ext uri="{FF2B5EF4-FFF2-40B4-BE49-F238E27FC236}">
+                <a16:creationId xmlns:a16="http://schemas.microsoft.com/office/drawing/2014/main" id="{1185C54B-AEFA-4EB4-B91D-5ACB1622AC5D}"/>
+              </a:ext>
+            </a:extLst>
+          </p:cNvPr>
+          <p:cNvCxnSpPr>
+            <a:cxnSpLocks/>
+            <a:stCxn id="16" idx="3"/>
+          </p:cNvCxnSpPr>
+          <p:nvPr/>
+        </p:nvCxnSpPr>
+        <p:spPr>
+          <a:xfrm rot="16200000" flipH="1">
+            <a:off x="4373426" y="3458125"/>
+            <a:ext cx="3337214" cy="1024126"/>
+          </a:xfrm>
+          <a:prstGeom prst="bentConnector3">
+            <a:avLst>
+              <a:gd name="adj1" fmla="val 4143"/>
+            </a:avLst>
+          </a:prstGeom>
+          <a:ln w="6350">
+            <a:solidFill>
+              <a:schemeClr val="accent3"/>
+            </a:solidFill>
+            <a:headEnd type="none" w="med" len="med"/>
+            <a:tailEnd type="none" w="med" len="med"/>
+          </a:ln>
+          <a:effectLst/>
+        </p:spPr>
+        <p:style>
+          <a:lnRef idx="1">
+            <a:schemeClr val="accent2"/>
+          </a:lnRef>
+          <a:fillRef idx="2">
+            <a:schemeClr val="accent2"/>
+          </a:fillRef>
+          <a:effectRef idx="1">
+            <a:schemeClr val="accent2"/>
+          </a:effectRef>
+          <a:fontRef idx="minor">
+            <a:schemeClr val="dk1"/>
+          </a:fontRef>
+        </p:style>
+      </p:cxnSp>
+      <p:sp>
+        <p:nvSpPr>
+          <p:cNvPr id="105" name="Isosceles Triangle 102">
+            <a:extLst>
+              <a:ext uri="{FF2B5EF4-FFF2-40B4-BE49-F238E27FC236}">
+                <a16:creationId xmlns:a16="http://schemas.microsoft.com/office/drawing/2014/main" id="{ED123130-6970-4949-BBE7-0E1F0B794254}"/>
+              </a:ext>
+            </a:extLst>
+          </p:cNvPr>
+          <p:cNvSpPr/>
+          <p:nvPr/>
+        </p:nvSpPr>
+        <p:spPr>
+          <a:xfrm rot="16200000" flipV="1">
+            <a:off x="5674243" y="5678725"/>
+            <a:ext cx="270504" cy="175523"/>
+          </a:xfrm>
+          <a:prstGeom prst="triangle">
+            <a:avLst/>
+          </a:prstGeom>
+          <a:ln w="6350">
+            <a:solidFill>
+              <a:schemeClr val="accent3"/>
+            </a:solidFill>
+          </a:ln>
+          <a:effectLst/>
+        </p:spPr>
+        <p:style>
+          <a:lnRef idx="1">
+            <a:schemeClr val="accent3"/>
+          </a:lnRef>
+          <a:fillRef idx="2">
+            <a:schemeClr val="accent3"/>
+          </a:fillRef>
+          <a:effectRef idx="1">
+            <a:schemeClr val="accent3"/>
+          </a:effectRef>
+          <a:fontRef idx="minor">
+            <a:schemeClr val="dk1"/>
+          </a:fontRef>
+        </p:style>
+        <p:txBody>
+          <a:bodyPr rtlCol="0" anchor="ctr"/>
+          <a:lstStyle/>
+          <a:p>
+            <a:pPr algn="ctr"/>
+            <a:endParaRPr lang="en-SG" sz="1050" b="1">
+              <a:solidFill>
+                <a:srgbClr val="92D050"/>
+              </a:solidFill>
+            </a:endParaRPr>
+          </a:p>
+        </p:txBody>
+      </p:sp>
+      <p:cxnSp>
+        <p:nvCxnSpPr>
+          <p:cNvPr id="87" name="Connector: Elbow 86">
+            <a:extLst>
+              <a:ext uri="{FF2B5EF4-FFF2-40B4-BE49-F238E27FC236}">
+                <a16:creationId xmlns:a16="http://schemas.microsoft.com/office/drawing/2014/main" id="{8CB8CB9C-4CB6-4C3F-B34C-96BB2D12A8D9}"/>
+              </a:ext>
+            </a:extLst>
+          </p:cNvPr>
+          <p:cNvCxnSpPr>
+            <a:stCxn id="37" idx="3"/>
+            <a:endCxn id="105" idx="3"/>
+          </p:cNvCxnSpPr>
+          <p:nvPr/>
+        </p:nvCxnSpPr>
+        <p:spPr>
+          <a:xfrm>
+            <a:off x="4880229" y="4347222"/>
+            <a:ext cx="841505" cy="1419265"/>
+          </a:xfrm>
+          <a:prstGeom prst="bentConnector3">
+            <a:avLst/>
+          </a:prstGeom>
+          <a:ln>
+            <a:solidFill>
+              <a:schemeClr val="accent3">
+                <a:lumMod val="60000"/>
+                <a:lumOff val="40000"/>
+              </a:schemeClr>
+            </a:solidFill>
+          </a:ln>
+        </p:spPr>
+        <p:style>
+          <a:lnRef idx="1">
+            <a:schemeClr val="accent1"/>
+          </a:lnRef>
+          <a:fillRef idx="0">
+            <a:schemeClr val="accent1"/>
+          </a:fillRef>
+          <a:effectRef idx="0">
+            <a:schemeClr val="accent1"/>
+          </a:effectRef>
+          <a:fontRef idx="minor">
+            <a:schemeClr val="tx1"/>
+          </a:fontRef>
+        </p:style>
+      </p:cxnSp>
+      <p:cxnSp>
+        <p:nvCxnSpPr>
+          <p:cNvPr id="108" name="Connector: Elbow 107">
+            <a:extLst>
+              <a:ext uri="{FF2B5EF4-FFF2-40B4-BE49-F238E27FC236}">
+                <a16:creationId xmlns:a16="http://schemas.microsoft.com/office/drawing/2014/main" id="{ACED9C22-D46F-4B9E-A05F-9EE4B3C2B5C5}"/>
+              </a:ext>
+            </a:extLst>
+          </p:cNvPr>
+          <p:cNvCxnSpPr>
+            <a:cxnSpLocks/>
+            <a:stCxn id="49" idx="3"/>
+            <a:endCxn id="105" idx="3"/>
+          </p:cNvCxnSpPr>
+          <p:nvPr/>
+        </p:nvCxnSpPr>
+        <p:spPr>
+          <a:xfrm>
+            <a:off x="4878503" y="4834580"/>
+            <a:ext cx="843231" cy="931907"/>
+          </a:xfrm>
+          <a:prstGeom prst="bentConnector3">
+            <a:avLst>
+              <a:gd name="adj1" fmla="val 50000"/>
+            </a:avLst>
+          </a:prstGeom>
+          <a:ln>
+            <a:solidFill>
+              <a:schemeClr val="accent3">
+                <a:lumMod val="60000"/>
+                <a:lumOff val="40000"/>
+              </a:schemeClr>
+            </a:solidFill>
+          </a:ln>
+        </p:spPr>
+        <p:style>
+          <a:lnRef idx="1">
+            <a:schemeClr val="accent1"/>
+          </a:lnRef>
+          <a:fillRef idx="0">
+            <a:schemeClr val="accent1"/>
+          </a:fillRef>
+          <a:effectRef idx="0">
+            <a:schemeClr val="accent1"/>
+          </a:effectRef>
+          <a:fontRef idx="minor">
+            <a:schemeClr val="tx1"/>
+          </a:fontRef>
+        </p:style>
+      </p:cxnSp>
+      <p:cxnSp>
+        <p:nvCxnSpPr>
+          <p:cNvPr id="112" name="Connector: Elbow 111">
+            <a:extLst>
+              <a:ext uri="{FF2B5EF4-FFF2-40B4-BE49-F238E27FC236}">
+                <a16:creationId xmlns:a16="http://schemas.microsoft.com/office/drawing/2014/main" id="{268DCA08-1636-4893-8218-B055FFD86E0F}"/>
+              </a:ext>
+            </a:extLst>
+          </p:cNvPr>
+          <p:cNvCxnSpPr>
+            <a:cxnSpLocks/>
+            <a:endCxn id="105" idx="3"/>
+          </p:cNvCxnSpPr>
+          <p:nvPr/>
+        </p:nvCxnSpPr>
+        <p:spPr>
+          <a:xfrm>
+            <a:off x="4892571" y="5410200"/>
+            <a:ext cx="829163" cy="356287"/>
+          </a:xfrm>
+          <a:prstGeom prst="bentConnector3">
+            <a:avLst>
+              <a:gd name="adj1" fmla="val 50000"/>
+            </a:avLst>
+          </a:prstGeom>
+          <a:ln>
+            <a:solidFill>
+              <a:schemeClr val="accent3">
+                <a:lumMod val="60000"/>
+                <a:lumOff val="40000"/>
+              </a:schemeClr>
+            </a:solidFill>
+          </a:ln>
+        </p:spPr>
+        <p:style>
+          <a:lnRef idx="1">
+            <a:schemeClr val="accent1"/>
+          </a:lnRef>
+          <a:fillRef idx="0">
+            <a:schemeClr val="accent1"/>
+          </a:fillRef>
+          <a:effectRef idx="0">
+            <a:schemeClr val="accent1"/>
+          </a:effectRef>
+          <a:fontRef idx="minor">
+            <a:schemeClr val="tx1"/>
+          </a:fontRef>
+        </p:style>
+      </p:cxnSp>
     </p:spTree>
     <p:extLst>
       <p:ext uri="{BB962C8B-B14F-4D97-AF65-F5344CB8AC3E}">

</xml_diff>

<commit_message>
more changes to implementation
</commit_message>
<xml_diff>
--- a/docs/diagrams/UiComponentClassDiagram.pptx
+++ b/docs/diagrams/UiComponentClassDiagram.pptx
@@ -208,7 +208,7 @@
           <a:p>
             <a:fld id="{F5CC4B3F-88C1-4FFA-B1B6-F41C21DC6924}" type="datetimeFigureOut">
               <a:rPr lang="en-US" smtClean="0"/>
-              <a:t>3/20/2018</a:t>
+              <a:t>4/10/2018</a:t>
             </a:fld>
             <a:endParaRPr lang="en-US"/>
           </a:p>
@@ -654,7 +654,7 @@
           <a:p>
             <a:fld id="{78C97017-6FC3-485B-9764-EAC9E56C1D49}" type="datetimeFigureOut">
               <a:rPr lang="en-US" smtClean="0"/>
-              <a:t>3/20/2018</a:t>
+              <a:t>4/10/2018</a:t>
             </a:fld>
             <a:endParaRPr lang="en-US"/>
           </a:p>
@@ -822,7 +822,7 @@
           <a:p>
             <a:fld id="{78C97017-6FC3-485B-9764-EAC9E56C1D49}" type="datetimeFigureOut">
               <a:rPr lang="en-US" smtClean="0"/>
-              <a:t>3/20/2018</a:t>
+              <a:t>4/10/2018</a:t>
             </a:fld>
             <a:endParaRPr lang="en-US"/>
           </a:p>
@@ -1000,7 +1000,7 @@
           <a:p>
             <a:fld id="{78C97017-6FC3-485B-9764-EAC9E56C1D49}" type="datetimeFigureOut">
               <a:rPr lang="en-US" smtClean="0"/>
-              <a:t>3/20/2018</a:t>
+              <a:t>4/10/2018</a:t>
             </a:fld>
             <a:endParaRPr lang="en-US"/>
           </a:p>
@@ -1168,7 +1168,7 @@
           <a:p>
             <a:fld id="{78C97017-6FC3-485B-9764-EAC9E56C1D49}" type="datetimeFigureOut">
               <a:rPr lang="en-US" smtClean="0"/>
-              <a:t>3/20/2018</a:t>
+              <a:t>4/10/2018</a:t>
             </a:fld>
             <a:endParaRPr lang="en-US"/>
           </a:p>
@@ -1413,7 +1413,7 @@
           <a:p>
             <a:fld id="{78C97017-6FC3-485B-9764-EAC9E56C1D49}" type="datetimeFigureOut">
               <a:rPr lang="en-US" smtClean="0"/>
-              <a:t>3/20/2018</a:t>
+              <a:t>4/10/2018</a:t>
             </a:fld>
             <a:endParaRPr lang="en-US"/>
           </a:p>
@@ -1698,7 +1698,7 @@
           <a:p>
             <a:fld id="{78C97017-6FC3-485B-9764-EAC9E56C1D49}" type="datetimeFigureOut">
               <a:rPr lang="en-US" smtClean="0"/>
-              <a:t>3/20/2018</a:t>
+              <a:t>4/10/2018</a:t>
             </a:fld>
             <a:endParaRPr lang="en-US"/>
           </a:p>
@@ -2117,7 +2117,7 @@
           <a:p>
             <a:fld id="{78C97017-6FC3-485B-9764-EAC9E56C1D49}" type="datetimeFigureOut">
               <a:rPr lang="en-US" smtClean="0"/>
-              <a:t>3/20/2018</a:t>
+              <a:t>4/10/2018</a:t>
             </a:fld>
             <a:endParaRPr lang="en-US"/>
           </a:p>
@@ -2234,7 +2234,7 @@
           <a:p>
             <a:fld id="{78C97017-6FC3-485B-9764-EAC9E56C1D49}" type="datetimeFigureOut">
               <a:rPr lang="en-US" smtClean="0"/>
-              <a:t>3/20/2018</a:t>
+              <a:t>4/10/2018</a:t>
             </a:fld>
             <a:endParaRPr lang="en-US"/>
           </a:p>
@@ -2329,7 +2329,7 @@
           <a:p>
             <a:fld id="{78C97017-6FC3-485B-9764-EAC9E56C1D49}" type="datetimeFigureOut">
               <a:rPr lang="en-US" smtClean="0"/>
-              <a:t>3/20/2018</a:t>
+              <a:t>4/10/2018</a:t>
             </a:fld>
             <a:endParaRPr lang="en-US"/>
           </a:p>
@@ -2604,7 +2604,7 @@
           <a:p>
             <a:fld id="{78C97017-6FC3-485B-9764-EAC9E56C1D49}" type="datetimeFigureOut">
               <a:rPr lang="en-US" smtClean="0"/>
-              <a:t>3/20/2018</a:t>
+              <a:t>4/10/2018</a:t>
             </a:fld>
             <a:endParaRPr lang="en-US"/>
           </a:p>
@@ -2856,7 +2856,7 @@
           <a:p>
             <a:fld id="{78C97017-6FC3-485B-9764-EAC9E56C1D49}" type="datetimeFigureOut">
               <a:rPr lang="en-US" smtClean="0"/>
-              <a:t>3/20/2018</a:t>
+              <a:t>4/10/2018</a:t>
             </a:fld>
             <a:endParaRPr lang="en-US"/>
           </a:p>
@@ -3067,7 +3067,7 @@
           <a:p>
             <a:fld id="{78C97017-6FC3-485B-9764-EAC9E56C1D49}" type="datetimeFigureOut">
               <a:rPr lang="en-US" smtClean="0"/>
-              <a:t>3/20/2018</a:t>
+              <a:t>4/10/2018</a:t>
             </a:fld>
             <a:endParaRPr lang="en-US"/>
           </a:p>
@@ -6317,72 +6317,6 @@
           </a:fontRef>
         </p:style>
       </p:cxnSp>
-      <p:sp>
-        <p:nvSpPr>
-          <p:cNvPr id="92" name="Rectangle 11">
-            <a:extLst>
-              <a:ext uri="{FF2B5EF4-FFF2-40B4-BE49-F238E27FC236}">
-                <a16:creationId xmlns:a16="http://schemas.microsoft.com/office/drawing/2014/main" id="{C4C6B5B6-F291-4677-9889-5BDD1146FCE6}"/>
-              </a:ext>
-            </a:extLst>
-          </p:cNvPr>
-          <p:cNvSpPr/>
-          <p:nvPr/>
-        </p:nvSpPr>
-        <p:spPr>
-          <a:xfrm>
-            <a:off x="5913026" y="5638795"/>
-            <a:ext cx="1040906" cy="236841"/>
-          </a:xfrm>
-          <a:prstGeom prst="rect">
-            <a:avLst/>
-          </a:prstGeom>
-          <a:ln w="19050">
-            <a:solidFill>
-              <a:schemeClr val="accent3"/>
-            </a:solidFill>
-          </a:ln>
-          <a:effectLst/>
-        </p:spPr>
-        <p:style>
-          <a:lnRef idx="1">
-            <a:schemeClr val="accent3"/>
-          </a:lnRef>
-          <a:fillRef idx="2">
-            <a:schemeClr val="accent3"/>
-          </a:fillRef>
-          <a:effectRef idx="1">
-            <a:schemeClr val="accent3"/>
-          </a:effectRef>
-          <a:fontRef idx="minor">
-            <a:schemeClr val="dk1"/>
-          </a:fontRef>
-        </p:style>
-        <p:txBody>
-          <a:bodyPr rtlCol="0" anchor="ctr"/>
-          <a:lstStyle/>
-          <a:p>
-            <a:pPr algn="ctr"/>
-            <a:r>
-              <a:rPr lang="en-US" sz="1050" b="1" dirty="0">
-                <a:solidFill>
-                  <a:schemeClr val="accent3">
-                    <a:lumMod val="75000"/>
-                  </a:schemeClr>
-                </a:solidFill>
-              </a:rPr>
-              <a:t>Card</a:t>
-            </a:r>
-            <a:endParaRPr lang="en-SG" sz="1050" b="1" dirty="0">
-              <a:solidFill>
-                <a:schemeClr val="accent3">
-                  <a:lumMod val="75000"/>
-                </a:schemeClr>
-              </a:solidFill>
-            </a:endParaRPr>
-          </a:p>
-        </p:txBody>
-      </p:sp>
       <p:cxnSp>
         <p:nvCxnSpPr>
           <p:cNvPr id="95" name="Elbow Connector 63">
@@ -6477,206 +6411,6 @@
           </a:effectRef>
           <a:fontRef idx="minor">
             <a:schemeClr val="dk1"/>
-          </a:fontRef>
-        </p:style>
-      </p:cxnSp>
-      <p:sp>
-        <p:nvSpPr>
-          <p:cNvPr id="105" name="Isosceles Triangle 102">
-            <a:extLst>
-              <a:ext uri="{FF2B5EF4-FFF2-40B4-BE49-F238E27FC236}">
-                <a16:creationId xmlns:a16="http://schemas.microsoft.com/office/drawing/2014/main" id="{ED123130-6970-4949-BBE7-0E1F0B794254}"/>
-              </a:ext>
-            </a:extLst>
-          </p:cNvPr>
-          <p:cNvSpPr/>
-          <p:nvPr/>
-        </p:nvSpPr>
-        <p:spPr>
-          <a:xfrm rot="16200000" flipV="1">
-            <a:off x="5674243" y="5678725"/>
-            <a:ext cx="270504" cy="175523"/>
-          </a:xfrm>
-          <a:prstGeom prst="triangle">
-            <a:avLst/>
-          </a:prstGeom>
-          <a:ln w="6350">
-            <a:solidFill>
-              <a:schemeClr val="accent3"/>
-            </a:solidFill>
-          </a:ln>
-          <a:effectLst/>
-        </p:spPr>
-        <p:style>
-          <a:lnRef idx="1">
-            <a:schemeClr val="accent3"/>
-          </a:lnRef>
-          <a:fillRef idx="2">
-            <a:schemeClr val="accent3"/>
-          </a:fillRef>
-          <a:effectRef idx="1">
-            <a:schemeClr val="accent3"/>
-          </a:effectRef>
-          <a:fontRef idx="minor">
-            <a:schemeClr val="dk1"/>
-          </a:fontRef>
-        </p:style>
-        <p:txBody>
-          <a:bodyPr rtlCol="0" anchor="ctr"/>
-          <a:lstStyle/>
-          <a:p>
-            <a:pPr algn="ctr"/>
-            <a:endParaRPr lang="en-SG" sz="1050" b="1">
-              <a:solidFill>
-                <a:srgbClr val="92D050"/>
-              </a:solidFill>
-            </a:endParaRPr>
-          </a:p>
-        </p:txBody>
-      </p:sp>
-      <p:cxnSp>
-        <p:nvCxnSpPr>
-          <p:cNvPr id="87" name="Connector: Elbow 86">
-            <a:extLst>
-              <a:ext uri="{FF2B5EF4-FFF2-40B4-BE49-F238E27FC236}">
-                <a16:creationId xmlns:a16="http://schemas.microsoft.com/office/drawing/2014/main" id="{8CB8CB9C-4CB6-4C3F-B34C-96BB2D12A8D9}"/>
-              </a:ext>
-            </a:extLst>
-          </p:cNvPr>
-          <p:cNvCxnSpPr>
-            <a:stCxn id="37" idx="3"/>
-            <a:endCxn id="105" idx="3"/>
-          </p:cNvCxnSpPr>
-          <p:nvPr/>
-        </p:nvCxnSpPr>
-        <p:spPr>
-          <a:xfrm>
-            <a:off x="4880229" y="4347222"/>
-            <a:ext cx="841505" cy="1419265"/>
-          </a:xfrm>
-          <a:prstGeom prst="bentConnector3">
-            <a:avLst/>
-          </a:prstGeom>
-          <a:ln>
-            <a:solidFill>
-              <a:schemeClr val="accent3">
-                <a:lumMod val="60000"/>
-                <a:lumOff val="40000"/>
-              </a:schemeClr>
-            </a:solidFill>
-          </a:ln>
-        </p:spPr>
-        <p:style>
-          <a:lnRef idx="1">
-            <a:schemeClr val="accent1"/>
-          </a:lnRef>
-          <a:fillRef idx="0">
-            <a:schemeClr val="accent1"/>
-          </a:fillRef>
-          <a:effectRef idx="0">
-            <a:schemeClr val="accent1"/>
-          </a:effectRef>
-          <a:fontRef idx="minor">
-            <a:schemeClr val="tx1"/>
-          </a:fontRef>
-        </p:style>
-      </p:cxnSp>
-      <p:cxnSp>
-        <p:nvCxnSpPr>
-          <p:cNvPr id="108" name="Connector: Elbow 107">
-            <a:extLst>
-              <a:ext uri="{FF2B5EF4-FFF2-40B4-BE49-F238E27FC236}">
-                <a16:creationId xmlns:a16="http://schemas.microsoft.com/office/drawing/2014/main" id="{ACED9C22-D46F-4B9E-A05F-9EE4B3C2B5C5}"/>
-              </a:ext>
-            </a:extLst>
-          </p:cNvPr>
-          <p:cNvCxnSpPr>
-            <a:cxnSpLocks/>
-            <a:stCxn id="49" idx="3"/>
-            <a:endCxn id="105" idx="3"/>
-          </p:cNvCxnSpPr>
-          <p:nvPr/>
-        </p:nvCxnSpPr>
-        <p:spPr>
-          <a:xfrm>
-            <a:off x="4878503" y="4834580"/>
-            <a:ext cx="843231" cy="931907"/>
-          </a:xfrm>
-          <a:prstGeom prst="bentConnector3">
-            <a:avLst>
-              <a:gd name="adj1" fmla="val 50000"/>
-            </a:avLst>
-          </a:prstGeom>
-          <a:ln>
-            <a:solidFill>
-              <a:schemeClr val="accent3">
-                <a:lumMod val="60000"/>
-                <a:lumOff val="40000"/>
-              </a:schemeClr>
-            </a:solidFill>
-          </a:ln>
-        </p:spPr>
-        <p:style>
-          <a:lnRef idx="1">
-            <a:schemeClr val="accent1"/>
-          </a:lnRef>
-          <a:fillRef idx="0">
-            <a:schemeClr val="accent1"/>
-          </a:fillRef>
-          <a:effectRef idx="0">
-            <a:schemeClr val="accent1"/>
-          </a:effectRef>
-          <a:fontRef idx="minor">
-            <a:schemeClr val="tx1"/>
-          </a:fontRef>
-        </p:style>
-      </p:cxnSp>
-      <p:cxnSp>
-        <p:nvCxnSpPr>
-          <p:cNvPr id="112" name="Connector: Elbow 111">
-            <a:extLst>
-              <a:ext uri="{FF2B5EF4-FFF2-40B4-BE49-F238E27FC236}">
-                <a16:creationId xmlns:a16="http://schemas.microsoft.com/office/drawing/2014/main" id="{268DCA08-1636-4893-8218-B055FFD86E0F}"/>
-              </a:ext>
-            </a:extLst>
-          </p:cNvPr>
-          <p:cNvCxnSpPr>
-            <a:cxnSpLocks/>
-            <a:endCxn id="105" idx="3"/>
-          </p:cNvCxnSpPr>
-          <p:nvPr/>
-        </p:nvCxnSpPr>
-        <p:spPr>
-          <a:xfrm>
-            <a:off x="4892571" y="5410200"/>
-            <a:ext cx="829163" cy="356287"/>
-          </a:xfrm>
-          <a:prstGeom prst="bentConnector3">
-            <a:avLst>
-              <a:gd name="adj1" fmla="val 50000"/>
-            </a:avLst>
-          </a:prstGeom>
-          <a:ln>
-            <a:solidFill>
-              <a:schemeClr val="accent3">
-                <a:lumMod val="60000"/>
-                <a:lumOff val="40000"/>
-              </a:schemeClr>
-            </a:solidFill>
-          </a:ln>
-        </p:spPr>
-        <p:style>
-          <a:lnRef idx="1">
-            <a:schemeClr val="accent1"/>
-          </a:lnRef>
-          <a:fillRef idx="0">
-            <a:schemeClr val="accent1"/>
-          </a:fillRef>
-          <a:effectRef idx="0">
-            <a:schemeClr val="accent1"/>
-          </a:effectRef>
-          <a:fontRef idx="minor">
-            <a:schemeClr val="tx1"/>
           </a:fontRef>
         </p:style>
       </p:cxnSp>

</xml_diff>